<commit_message>
Update college and QQ group
</commit_message>
<xml_diff>
--- a/slides/02-Java语言基础.pptx
+++ b/slides/02-Java语言基础.pptx
@@ -185,132 +185,16 @@
 </p:presentation>
 </file>
 
+<file path=ppt/revisionInfo.xml><?xml version="1.0" encoding="utf-8"?>
+<p1510:revInfo xmlns:a="http://schemas.openxmlformats.org/drawingml/2006/main" xmlns:r="http://schemas.openxmlformats.org/officeDocument/2006/relationships" xmlns:p1510="http://schemas.microsoft.com/office/powerpoint/2015/10/main">
+  <p1510:revLst>
+    <p1510:client id="{575EB646-C274-45FE-83ED-B2D4AA3DC509}" v="4" dt="2025-04-14T12:12:28.923"/>
+  </p1510:revLst>
+</p1510:revInfo>
+</file>
+
 <file path=ppt/changesInfos/changesInfo1.xml><?xml version="1.0" encoding="utf-8"?>
 <pc:chgInfo xmlns:a="http://schemas.openxmlformats.org/drawingml/2006/main" xmlns:r="http://schemas.openxmlformats.org/officeDocument/2006/relationships" xmlns:ac="http://schemas.microsoft.com/office/drawing/2013/main/command" xmlns:pc="http://schemas.microsoft.com/office/powerpoint/2013/main/command">
-  <pc:docChgLst>
-    <pc:chgData name="pdcxs" userId="f53f700a-6709-4045-8975-3edaa594be1c" providerId="ADAL" clId="{7D72E6D7-8602-457B-9799-756D4526B4C7}"/>
-    <pc:docChg chg="modSld">
-      <pc:chgData name="pdcxs" userId="f53f700a-6709-4045-8975-3edaa594be1c" providerId="ADAL" clId="{7D72E6D7-8602-457B-9799-756D4526B4C7}" dt="2024-03-04T14:32:02.691" v="44" actId="20577"/>
-      <pc:docMkLst>
-        <pc:docMk/>
-      </pc:docMkLst>
-      <pc:sldChg chg="modSp mod">
-        <pc:chgData name="pdcxs" userId="f53f700a-6709-4045-8975-3edaa594be1c" providerId="ADAL" clId="{7D72E6D7-8602-457B-9799-756D4526B4C7}" dt="2024-03-04T14:31:38.435" v="16" actId="20577"/>
-        <pc:sldMkLst>
-          <pc:docMk/>
-          <pc:sldMk cId="898089864" sldId="330"/>
-        </pc:sldMkLst>
-        <pc:spChg chg="mod">
-          <ac:chgData name="pdcxs" userId="f53f700a-6709-4045-8975-3edaa594be1c" providerId="ADAL" clId="{7D72E6D7-8602-457B-9799-756D4526B4C7}" dt="2024-03-04T14:31:32.971" v="8" actId="20577"/>
-          <ac:spMkLst>
-            <pc:docMk/>
-            <pc:sldMk cId="898089864" sldId="330"/>
-            <ac:spMk id="3" creationId="{424618DB-F642-4BF3-9463-4BE3C54FB56C}"/>
-          </ac:spMkLst>
-        </pc:spChg>
-        <pc:spChg chg="mod">
-          <ac:chgData name="pdcxs" userId="f53f700a-6709-4045-8975-3edaa594be1c" providerId="ADAL" clId="{7D72E6D7-8602-457B-9799-756D4526B4C7}" dt="2024-03-04T14:31:35.643" v="12" actId="20577"/>
-          <ac:spMkLst>
-            <pc:docMk/>
-            <pc:sldMk cId="898089864" sldId="330"/>
-            <ac:spMk id="7" creationId="{723BB7D7-6EDC-4D77-83E1-9FA223F0B8E6}"/>
-          </ac:spMkLst>
-        </pc:spChg>
-        <pc:spChg chg="mod">
-          <ac:chgData name="pdcxs" userId="f53f700a-6709-4045-8975-3edaa594be1c" providerId="ADAL" clId="{7D72E6D7-8602-457B-9799-756D4526B4C7}" dt="2024-03-04T14:31:38.435" v="16" actId="20577"/>
-          <ac:spMkLst>
-            <pc:docMk/>
-            <pc:sldMk cId="898089864" sldId="330"/>
-            <ac:spMk id="23" creationId="{6982B1B5-9E17-4561-992F-A896B3C8F0E5}"/>
-          </ac:spMkLst>
-        </pc:spChg>
-      </pc:sldChg>
-      <pc:sldChg chg="modSp mod">
-        <pc:chgData name="pdcxs" userId="f53f700a-6709-4045-8975-3edaa594be1c" providerId="ADAL" clId="{7D72E6D7-8602-457B-9799-756D4526B4C7}" dt="2024-03-04T14:32:02.691" v="44" actId="20577"/>
-        <pc:sldMkLst>
-          <pc:docMk/>
-          <pc:sldMk cId="3669361931" sldId="332"/>
-        </pc:sldMkLst>
-        <pc:spChg chg="mod">
-          <ac:chgData name="pdcxs" userId="f53f700a-6709-4045-8975-3edaa594be1c" providerId="ADAL" clId="{7D72E6D7-8602-457B-9799-756D4526B4C7}" dt="2024-03-04T14:32:02.691" v="44" actId="20577"/>
-          <ac:spMkLst>
-            <pc:docMk/>
-            <pc:sldMk cId="3669361931" sldId="332"/>
-            <ac:spMk id="3" creationId="{760DBD57-F507-4081-9B0E-2D2C770726D6}"/>
-          </ac:spMkLst>
-        </pc:spChg>
-      </pc:sldChg>
-      <pc:sldChg chg="modSp mod">
-        <pc:chgData name="pdcxs" userId="f53f700a-6709-4045-8975-3edaa594be1c" providerId="ADAL" clId="{7D72E6D7-8602-457B-9799-756D4526B4C7}" dt="2024-03-04T14:31:50.675" v="32" actId="20577"/>
-        <pc:sldMkLst>
-          <pc:docMk/>
-          <pc:sldMk cId="3509106168" sldId="336"/>
-        </pc:sldMkLst>
-        <pc:spChg chg="mod">
-          <ac:chgData name="pdcxs" userId="f53f700a-6709-4045-8975-3edaa594be1c" providerId="ADAL" clId="{7D72E6D7-8602-457B-9799-756D4526B4C7}" dt="2024-03-04T14:31:43.656" v="20" actId="20577"/>
-          <ac:spMkLst>
-            <pc:docMk/>
-            <pc:sldMk cId="3509106168" sldId="336"/>
-            <ac:spMk id="3" creationId="{4B1BEBAC-1AC8-4955-832D-276AFA3DD716}"/>
-          </ac:spMkLst>
-        </pc:spChg>
-        <pc:spChg chg="mod">
-          <ac:chgData name="pdcxs" userId="f53f700a-6709-4045-8975-3edaa594be1c" providerId="ADAL" clId="{7D72E6D7-8602-457B-9799-756D4526B4C7}" dt="2024-03-04T14:31:47.595" v="28" actId="20577"/>
-          <ac:spMkLst>
-            <pc:docMk/>
-            <pc:sldMk cId="3509106168" sldId="336"/>
-            <ac:spMk id="13" creationId="{8B1EDC78-375F-471B-9A72-75D200819D99}"/>
-          </ac:spMkLst>
-        </pc:spChg>
-        <pc:spChg chg="mod">
-          <ac:chgData name="pdcxs" userId="f53f700a-6709-4045-8975-3edaa594be1c" providerId="ADAL" clId="{7D72E6D7-8602-457B-9799-756D4526B4C7}" dt="2024-03-04T14:31:50.675" v="32" actId="20577"/>
-          <ac:spMkLst>
-            <pc:docMk/>
-            <pc:sldMk cId="3509106168" sldId="336"/>
-            <ac:spMk id="15" creationId="{AEEB3640-E994-4D00-B82C-A038C83AFD9E}"/>
-          </ac:spMkLst>
-        </pc:spChg>
-      </pc:sldChg>
-      <pc:sldChg chg="modSp mod">
-        <pc:chgData name="pdcxs" userId="f53f700a-6709-4045-8975-3edaa594be1c" providerId="ADAL" clId="{7D72E6D7-8602-457B-9799-756D4526B4C7}" dt="2024-03-04T14:31:58.312" v="40" actId="20577"/>
-        <pc:sldMkLst>
-          <pc:docMk/>
-          <pc:sldMk cId="2222059338" sldId="337"/>
-        </pc:sldMkLst>
-        <pc:spChg chg="mod">
-          <ac:chgData name="pdcxs" userId="f53f700a-6709-4045-8975-3edaa594be1c" providerId="ADAL" clId="{7D72E6D7-8602-457B-9799-756D4526B4C7}" dt="2024-03-04T14:31:55.716" v="36" actId="20577"/>
-          <ac:spMkLst>
-            <pc:docMk/>
-            <pc:sldMk cId="2222059338" sldId="337"/>
-            <ac:spMk id="3" creationId="{4B1BEBAC-1AC8-4955-832D-276AFA3DD716}"/>
-          </ac:spMkLst>
-        </pc:spChg>
-        <pc:spChg chg="mod">
-          <ac:chgData name="pdcxs" userId="f53f700a-6709-4045-8975-3edaa594be1c" providerId="ADAL" clId="{7D72E6D7-8602-457B-9799-756D4526B4C7}" dt="2024-03-04T14:31:58.312" v="40" actId="20577"/>
-          <ac:spMkLst>
-            <pc:docMk/>
-            <pc:sldMk cId="2222059338" sldId="337"/>
-            <ac:spMk id="13" creationId="{8B1EDC78-375F-471B-9A72-75D200819D99}"/>
-          </ac:spMkLst>
-        </pc:spChg>
-      </pc:sldChg>
-      <pc:sldChg chg="modSp mod">
-        <pc:chgData name="pdcxs" userId="f53f700a-6709-4045-8975-3edaa594be1c" providerId="ADAL" clId="{7D72E6D7-8602-457B-9799-756D4526B4C7}" dt="2024-03-04T14:31:22.633" v="4" actId="20577"/>
-        <pc:sldMkLst>
-          <pc:docMk/>
-          <pc:sldMk cId="1608008779" sldId="339"/>
-        </pc:sldMkLst>
-        <pc:spChg chg="mod">
-          <ac:chgData name="pdcxs" userId="f53f700a-6709-4045-8975-3edaa594be1c" providerId="ADAL" clId="{7D72E6D7-8602-457B-9799-756D4526B4C7}" dt="2024-03-04T14:31:22.633" v="4" actId="20577"/>
-          <ac:spMkLst>
-            <pc:docMk/>
-            <pc:sldMk cId="1608008779" sldId="339"/>
-            <ac:spMk id="3" creationId="{424618DB-F642-4BF3-9463-4BE3C54FB56C}"/>
-          </ac:spMkLst>
-        </pc:spChg>
-      </pc:sldChg>
-    </pc:docChg>
-  </pc:docChgLst>
   <pc:docChgLst>
     <pc:chgData name="pdcxs" userId="f53f700a-6709-4045-8975-3edaa594be1c" providerId="ADAL" clId="{7055DCD8-195B-4761-8910-F9F4E1ABBC7C}"/>
     <pc:docChg chg="custSel addSld modSld">
@@ -324,30 +208,6 @@
           <pc:docMk/>
           <pc:sldMk cId="898089864" sldId="330"/>
         </pc:sldMkLst>
-        <pc:spChg chg="mod">
-          <ac:chgData name="pdcxs" userId="f53f700a-6709-4045-8975-3edaa594be1c" providerId="ADAL" clId="{7055DCD8-195B-4761-8910-F9F4E1ABBC7C}" dt="2024-02-28T07:03:46.157" v="41" actId="20577"/>
-          <ac:spMkLst>
-            <pc:docMk/>
-            <pc:sldMk cId="898089864" sldId="330"/>
-            <ac:spMk id="3" creationId="{424618DB-F642-4BF3-9463-4BE3C54FB56C}"/>
-          </ac:spMkLst>
-        </pc:spChg>
-        <pc:spChg chg="mod">
-          <ac:chgData name="pdcxs" userId="f53f700a-6709-4045-8975-3edaa594be1c" providerId="ADAL" clId="{7055DCD8-195B-4761-8910-F9F4E1ABBC7C}" dt="2024-02-28T07:07:17.982" v="362" actId="20577"/>
-          <ac:spMkLst>
-            <pc:docMk/>
-            <pc:sldMk cId="898089864" sldId="330"/>
-            <ac:spMk id="7" creationId="{723BB7D7-6EDC-4D77-83E1-9FA223F0B8E6}"/>
-          </ac:spMkLst>
-        </pc:spChg>
-        <pc:spChg chg="mod">
-          <ac:chgData name="pdcxs" userId="f53f700a-6709-4045-8975-3edaa594be1c" providerId="ADAL" clId="{7055DCD8-195B-4761-8910-F9F4E1ABBC7C}" dt="2024-02-28T07:04:21.836" v="100" actId="20577"/>
-          <ac:spMkLst>
-            <pc:docMk/>
-            <pc:sldMk cId="898089864" sldId="330"/>
-            <ac:spMk id="23" creationId="{6982B1B5-9E17-4561-992F-A896B3C8F0E5}"/>
-          </ac:spMkLst>
-        </pc:spChg>
       </pc:sldChg>
       <pc:sldChg chg="modSp mod">
         <pc:chgData name="pdcxs" userId="f53f700a-6709-4045-8975-3edaa594be1c" providerId="ADAL" clId="{7055DCD8-195B-4761-8910-F9F4E1ABBC7C}" dt="2024-02-28T07:06:17.572" v="313" actId="20577"/>
@@ -355,14 +215,6 @@
           <pc:docMk/>
           <pc:sldMk cId="3669361931" sldId="332"/>
         </pc:sldMkLst>
-        <pc:spChg chg="mod">
-          <ac:chgData name="pdcxs" userId="f53f700a-6709-4045-8975-3edaa594be1c" providerId="ADAL" clId="{7055DCD8-195B-4761-8910-F9F4E1ABBC7C}" dt="2024-02-28T07:06:17.572" v="313" actId="20577"/>
-          <ac:spMkLst>
-            <pc:docMk/>
-            <pc:sldMk cId="3669361931" sldId="332"/>
-            <ac:spMk id="3" creationId="{760DBD57-F507-4081-9B0E-2D2C770726D6}"/>
-          </ac:spMkLst>
-        </pc:spChg>
       </pc:sldChg>
       <pc:sldChg chg="modSp mod">
         <pc:chgData name="pdcxs" userId="f53f700a-6709-4045-8975-3edaa594be1c" providerId="ADAL" clId="{7055DCD8-195B-4761-8910-F9F4E1ABBC7C}" dt="2024-02-28T07:05:20.210" v="208" actId="20577"/>
@@ -370,30 +222,6 @@
           <pc:docMk/>
           <pc:sldMk cId="3509106168" sldId="336"/>
         </pc:sldMkLst>
-        <pc:spChg chg="mod">
-          <ac:chgData name="pdcxs" userId="f53f700a-6709-4045-8975-3edaa594be1c" providerId="ADAL" clId="{7055DCD8-195B-4761-8910-F9F4E1ABBC7C}" dt="2024-02-28T07:04:45.799" v="131" actId="20577"/>
-          <ac:spMkLst>
-            <pc:docMk/>
-            <pc:sldMk cId="3509106168" sldId="336"/>
-            <ac:spMk id="3" creationId="{4B1BEBAC-1AC8-4955-832D-276AFA3DD716}"/>
-          </ac:spMkLst>
-        </pc:spChg>
-        <pc:spChg chg="mod">
-          <ac:chgData name="pdcxs" userId="f53f700a-6709-4045-8975-3edaa594be1c" providerId="ADAL" clId="{7055DCD8-195B-4761-8910-F9F4E1ABBC7C}" dt="2024-02-28T07:05:02.175" v="171" actId="20577"/>
-          <ac:spMkLst>
-            <pc:docMk/>
-            <pc:sldMk cId="3509106168" sldId="336"/>
-            <ac:spMk id="13" creationId="{8B1EDC78-375F-471B-9A72-75D200819D99}"/>
-          </ac:spMkLst>
-        </pc:spChg>
-        <pc:spChg chg="mod">
-          <ac:chgData name="pdcxs" userId="f53f700a-6709-4045-8975-3edaa594be1c" providerId="ADAL" clId="{7055DCD8-195B-4761-8910-F9F4E1ABBC7C}" dt="2024-02-28T07:05:20.210" v="208" actId="20577"/>
-          <ac:spMkLst>
-            <pc:docMk/>
-            <pc:sldMk cId="3509106168" sldId="336"/>
-            <ac:spMk id="15" creationId="{AEEB3640-E994-4D00-B82C-A038C83AFD9E}"/>
-          </ac:spMkLst>
-        </pc:spChg>
       </pc:sldChg>
       <pc:sldChg chg="modSp mod">
         <pc:chgData name="pdcxs" userId="f53f700a-6709-4045-8975-3edaa594be1c" providerId="ADAL" clId="{7055DCD8-195B-4761-8910-F9F4E1ABBC7C}" dt="2024-02-28T07:06:04.393" v="282" actId="20577"/>
@@ -401,22 +229,6 @@
           <pc:docMk/>
           <pc:sldMk cId="2222059338" sldId="337"/>
         </pc:sldMkLst>
-        <pc:spChg chg="mod">
-          <ac:chgData name="pdcxs" userId="f53f700a-6709-4045-8975-3edaa594be1c" providerId="ADAL" clId="{7055DCD8-195B-4761-8910-F9F4E1ABBC7C}" dt="2024-02-28T07:05:49.193" v="246" actId="20577"/>
-          <ac:spMkLst>
-            <pc:docMk/>
-            <pc:sldMk cId="2222059338" sldId="337"/>
-            <ac:spMk id="3" creationId="{4B1BEBAC-1AC8-4955-832D-276AFA3DD716}"/>
-          </ac:spMkLst>
-        </pc:spChg>
-        <pc:spChg chg="mod">
-          <ac:chgData name="pdcxs" userId="f53f700a-6709-4045-8975-3edaa594be1c" providerId="ADAL" clId="{7055DCD8-195B-4761-8910-F9F4E1ABBC7C}" dt="2024-02-28T07:06:04.393" v="282" actId="20577"/>
-          <ac:spMkLst>
-            <pc:docMk/>
-            <pc:sldMk cId="2222059338" sldId="337"/>
-            <ac:spMk id="13" creationId="{8B1EDC78-375F-471B-9A72-75D200819D99}"/>
-          </ac:spMkLst>
-        </pc:spChg>
       </pc:sldChg>
       <pc:sldChg chg="delSp modSp add mod">
         <pc:chgData name="pdcxs" userId="f53f700a-6709-4045-8975-3edaa594be1c" providerId="ADAL" clId="{7055DCD8-195B-4761-8910-F9F4E1ABBC7C}" dt="2024-02-28T07:07:05.337" v="361" actId="1036"/>
@@ -424,178 +236,6 @@
           <pc:docMk/>
           <pc:sldMk cId="1608008779" sldId="339"/>
         </pc:sldMkLst>
-        <pc:spChg chg="mod">
-          <ac:chgData name="pdcxs" userId="f53f700a-6709-4045-8975-3edaa594be1c" providerId="ADAL" clId="{7055DCD8-195B-4761-8910-F9F4E1ABBC7C}" dt="2024-02-28T07:07:05.337" v="361" actId="1036"/>
-          <ac:spMkLst>
-            <pc:docMk/>
-            <pc:sldMk cId="1608008779" sldId="339"/>
-            <ac:spMk id="3" creationId="{424618DB-F642-4BF3-9463-4BE3C54FB56C}"/>
-          </ac:spMkLst>
-        </pc:spChg>
-        <pc:spChg chg="mod">
-          <ac:chgData name="pdcxs" userId="f53f700a-6709-4045-8975-3edaa594be1c" providerId="ADAL" clId="{7055DCD8-195B-4761-8910-F9F4E1ABBC7C}" dt="2024-02-28T07:07:05.337" v="361" actId="1036"/>
-          <ac:spMkLst>
-            <pc:docMk/>
-            <pc:sldMk cId="1608008779" sldId="339"/>
-            <ac:spMk id="4" creationId="{BBE73B0F-E519-460E-BAE4-1AE6F8755234}"/>
-          </ac:spMkLst>
-        </pc:spChg>
-        <pc:spChg chg="del mod">
-          <ac:chgData name="pdcxs" userId="f53f700a-6709-4045-8975-3edaa594be1c" providerId="ADAL" clId="{7055DCD8-195B-4761-8910-F9F4E1ABBC7C}" dt="2024-02-28T07:07:00.650" v="347" actId="478"/>
-          <ac:spMkLst>
-            <pc:docMk/>
-            <pc:sldMk cId="1608008779" sldId="339"/>
-            <ac:spMk id="7" creationId="{723BB7D7-6EDC-4D77-83E1-9FA223F0B8E6}"/>
-          </ac:spMkLst>
-        </pc:spChg>
-        <pc:spChg chg="mod">
-          <ac:chgData name="pdcxs" userId="f53f700a-6709-4045-8975-3edaa594be1c" providerId="ADAL" clId="{7055DCD8-195B-4761-8910-F9F4E1ABBC7C}" dt="2024-02-28T07:06:38.554" v="315"/>
-          <ac:spMkLst>
-            <pc:docMk/>
-            <pc:sldMk cId="1608008779" sldId="339"/>
-            <ac:spMk id="12" creationId="{FBAB8972-87CC-4170-AA59-C469F5151BAD}"/>
-          </ac:spMkLst>
-        </pc:spChg>
-        <pc:spChg chg="del">
-          <ac:chgData name="pdcxs" userId="f53f700a-6709-4045-8975-3edaa594be1c" providerId="ADAL" clId="{7055DCD8-195B-4761-8910-F9F4E1ABBC7C}" dt="2024-02-28T07:07:01.365" v="348" actId="478"/>
-          <ac:spMkLst>
-            <pc:docMk/>
-            <pc:sldMk cId="1608008779" sldId="339"/>
-            <ac:spMk id="13" creationId="{8D8B2D4D-A30B-4FE7-9E99-C71DCEF59DBF}"/>
-          </ac:spMkLst>
-        </pc:spChg>
-        <pc:spChg chg="del">
-          <ac:chgData name="pdcxs" userId="f53f700a-6709-4045-8975-3edaa594be1c" providerId="ADAL" clId="{7055DCD8-195B-4761-8910-F9F4E1ABBC7C}" dt="2024-02-28T07:06:59.057" v="345" actId="478"/>
-          <ac:spMkLst>
-            <pc:docMk/>
-            <pc:sldMk cId="1608008779" sldId="339"/>
-            <ac:spMk id="15" creationId="{E15A6C4A-A97E-4957-92CE-751AC4E872C1}"/>
-          </ac:spMkLst>
-        </pc:spChg>
-        <pc:spChg chg="del">
-          <ac:chgData name="pdcxs" userId="f53f700a-6709-4045-8975-3edaa594be1c" providerId="ADAL" clId="{7055DCD8-195B-4761-8910-F9F4E1ABBC7C}" dt="2024-02-28T07:07:00.038" v="346" actId="478"/>
-          <ac:spMkLst>
-            <pc:docMk/>
-            <pc:sldMk cId="1608008779" sldId="339"/>
-            <ac:spMk id="23" creationId="{6982B1B5-9E17-4561-992F-A896B3C8F0E5}"/>
-          </ac:spMkLst>
-        </pc:spChg>
-      </pc:sldChg>
-    </pc:docChg>
-  </pc:docChgLst>
-  <pc:docChgLst>
-    <pc:chgData name="pdcxs" userId="f53f700a-6709-4045-8975-3edaa594be1c" providerId="ADAL" clId="{FEB349EA-F409-46C1-804E-F00288D1825A}"/>
-    <pc:docChg chg="modSld">
-      <pc:chgData name="pdcxs" userId="f53f700a-6709-4045-8975-3edaa594be1c" providerId="ADAL" clId="{FEB349EA-F409-46C1-804E-F00288D1825A}" dt="2023-02-23T07:11:18.296" v="6" actId="20577"/>
-      <pc:docMkLst>
-        <pc:docMk/>
-      </pc:docMkLst>
-      <pc:sldChg chg="modSp mod">
-        <pc:chgData name="pdcxs" userId="f53f700a-6709-4045-8975-3edaa594be1c" providerId="ADAL" clId="{FEB349EA-F409-46C1-804E-F00288D1825A}" dt="2023-02-23T07:11:18.296" v="6" actId="20577"/>
-        <pc:sldMkLst>
-          <pc:docMk/>
-          <pc:sldMk cId="753176371" sldId="306"/>
-        </pc:sldMkLst>
-        <pc:spChg chg="mod">
-          <ac:chgData name="pdcxs" userId="f53f700a-6709-4045-8975-3edaa594be1c" providerId="ADAL" clId="{FEB349EA-F409-46C1-804E-F00288D1825A}" dt="2023-02-23T07:11:18.296" v="6" actId="20577"/>
-          <ac:spMkLst>
-            <pc:docMk/>
-            <pc:sldMk cId="753176371" sldId="306"/>
-            <ac:spMk id="19" creationId="{00000000-0000-0000-0000-000000000000}"/>
-          </ac:spMkLst>
-        </pc:spChg>
-      </pc:sldChg>
-    </pc:docChg>
-  </pc:docChgLst>
-  <pc:docChgLst>
-    <pc:chgData name="pdcxs" userId="f53f700a-6709-4045-8975-3edaa594be1c" providerId="ADAL" clId="{0FB24E5E-FE6E-4732-9C4A-D738238F2A72}"/>
-    <pc:docChg chg="custSel modSld">
-      <pc:chgData name="pdcxs" userId="f53f700a-6709-4045-8975-3edaa594be1c" providerId="ADAL" clId="{0FB24E5E-FE6E-4732-9C4A-D738238F2A72}" dt="2024-02-28T07:09:07.533" v="23" actId="1076"/>
-      <pc:docMkLst>
-        <pc:docMk/>
-      </pc:docMkLst>
-      <pc:sldChg chg="addSp modSp mod">
-        <pc:chgData name="pdcxs" userId="f53f700a-6709-4045-8975-3edaa594be1c" providerId="ADAL" clId="{0FB24E5E-FE6E-4732-9C4A-D738238F2A72}" dt="2024-02-28T07:09:07.533" v="23" actId="1076"/>
-        <pc:sldMkLst>
-          <pc:docMk/>
-          <pc:sldMk cId="898089864" sldId="330"/>
-        </pc:sldMkLst>
-        <pc:spChg chg="add mod">
-          <ac:chgData name="pdcxs" userId="f53f700a-6709-4045-8975-3edaa594be1c" providerId="ADAL" clId="{0FB24E5E-FE6E-4732-9C4A-D738238F2A72}" dt="2024-02-28T07:09:07.533" v="23" actId="1076"/>
-          <ac:spMkLst>
-            <pc:docMk/>
-            <pc:sldMk cId="898089864" sldId="330"/>
-            <ac:spMk id="5" creationId="{42C4DCB6-0FD4-22A0-C545-93D12EEA3CF9}"/>
-          </ac:spMkLst>
-        </pc:spChg>
-      </pc:sldChg>
-      <pc:sldChg chg="addSp modSp mod">
-        <pc:chgData name="pdcxs" userId="f53f700a-6709-4045-8975-3edaa594be1c" providerId="ADAL" clId="{0FB24E5E-FE6E-4732-9C4A-D738238F2A72}" dt="2024-02-28T07:08:47.869" v="17" actId="1076"/>
-        <pc:sldMkLst>
-          <pc:docMk/>
-          <pc:sldMk cId="3669361931" sldId="332"/>
-        </pc:sldMkLst>
-        <pc:spChg chg="add mod">
-          <ac:chgData name="pdcxs" userId="f53f700a-6709-4045-8975-3edaa594be1c" providerId="ADAL" clId="{0FB24E5E-FE6E-4732-9C4A-D738238F2A72}" dt="2024-02-28T07:08:47.869" v="17" actId="1076"/>
-          <ac:spMkLst>
-            <pc:docMk/>
-            <pc:sldMk cId="3669361931" sldId="332"/>
-            <ac:spMk id="4" creationId="{A9CDBB54-0C6D-EE58-A0DB-2D10628D1825}"/>
-          </ac:spMkLst>
-        </pc:spChg>
-      </pc:sldChg>
-      <pc:sldChg chg="addSp modSp mod">
-        <pc:chgData name="pdcxs" userId="f53f700a-6709-4045-8975-3edaa594be1c" providerId="ADAL" clId="{0FB24E5E-FE6E-4732-9C4A-D738238F2A72}" dt="2024-02-28T07:08:54.717" v="19" actId="1076"/>
-        <pc:sldMkLst>
-          <pc:docMk/>
-          <pc:sldMk cId="3509106168" sldId="336"/>
-        </pc:sldMkLst>
-        <pc:spChg chg="add mod">
-          <ac:chgData name="pdcxs" userId="f53f700a-6709-4045-8975-3edaa594be1c" providerId="ADAL" clId="{0FB24E5E-FE6E-4732-9C4A-D738238F2A72}" dt="2024-02-28T07:08:54.717" v="19" actId="1076"/>
-          <ac:spMkLst>
-            <pc:docMk/>
-            <pc:sldMk cId="3509106168" sldId="336"/>
-            <ac:spMk id="4" creationId="{9CED3137-9156-04AE-EFEA-7A1239EB12E8}"/>
-          </ac:spMkLst>
-        </pc:spChg>
-      </pc:sldChg>
-      <pc:sldChg chg="addSp modSp mod">
-        <pc:chgData name="pdcxs" userId="f53f700a-6709-4045-8975-3edaa594be1c" providerId="ADAL" clId="{0FB24E5E-FE6E-4732-9C4A-D738238F2A72}" dt="2024-02-28T07:08:59.021" v="21" actId="1076"/>
-        <pc:sldMkLst>
-          <pc:docMk/>
-          <pc:sldMk cId="2222059338" sldId="337"/>
-        </pc:sldMkLst>
-        <pc:spChg chg="add mod">
-          <ac:chgData name="pdcxs" userId="f53f700a-6709-4045-8975-3edaa594be1c" providerId="ADAL" clId="{0FB24E5E-FE6E-4732-9C4A-D738238F2A72}" dt="2024-02-28T07:08:59.021" v="21" actId="1076"/>
-          <ac:spMkLst>
-            <pc:docMk/>
-            <pc:sldMk cId="2222059338" sldId="337"/>
-            <ac:spMk id="4" creationId="{B7E19458-19FB-3CD3-D27C-CF29FA57179E}"/>
-          </ac:spMkLst>
-        </pc:spChg>
-      </pc:sldChg>
-      <pc:sldChg chg="addSp delSp modSp mod">
-        <pc:chgData name="pdcxs" userId="f53f700a-6709-4045-8975-3edaa594be1c" providerId="ADAL" clId="{0FB24E5E-FE6E-4732-9C4A-D738238F2A72}" dt="2024-02-28T07:08:39.603" v="15" actId="1076"/>
-        <pc:sldMkLst>
-          <pc:docMk/>
-          <pc:sldMk cId="1608008779" sldId="339"/>
-        </pc:sldMkLst>
-        <pc:spChg chg="add mod">
-          <ac:chgData name="pdcxs" userId="f53f700a-6709-4045-8975-3edaa594be1c" providerId="ADAL" clId="{0FB24E5E-FE6E-4732-9C4A-D738238F2A72}" dt="2024-02-28T07:08:39.603" v="15" actId="1076"/>
-          <ac:spMkLst>
-            <pc:docMk/>
-            <pc:sldMk cId="1608008779" sldId="339"/>
-            <ac:spMk id="5" creationId="{C9EFB0E0-DC99-E41A-5150-CEFD867FBEC0}"/>
-          </ac:spMkLst>
-        </pc:spChg>
-        <pc:spChg chg="add del mod">
-          <ac:chgData name="pdcxs" userId="f53f700a-6709-4045-8975-3edaa594be1c" providerId="ADAL" clId="{0FB24E5E-FE6E-4732-9C4A-D738238F2A72}" dt="2024-02-28T07:08:27.754" v="13" actId="478"/>
-          <ac:spMkLst>
-            <pc:docMk/>
-            <pc:sldMk cId="1608008779" sldId="339"/>
-            <ac:spMk id="6" creationId="{B8D97232-6262-2449-5100-EA091BF5F7B8}"/>
-          </ac:spMkLst>
-        </pc:spChg>
       </pc:sldChg>
     </pc:docChg>
   </pc:docChgLst>
@@ -618,6 +258,134 @@
         <pc:sldMkLst>
           <pc:docMk/>
           <pc:sldMk cId="450456564" sldId="338"/>
+        </pc:sldMkLst>
+      </pc:sldChg>
+    </pc:docChg>
+  </pc:docChgLst>
+  <pc:docChgLst>
+    <pc:chgData name="pdcxs" userId="f53f700a-6709-4045-8975-3edaa594be1c" providerId="ADAL" clId="{0FB24E5E-FE6E-4732-9C4A-D738238F2A72}"/>
+    <pc:docChg chg="custSel modSld">
+      <pc:chgData name="pdcxs" userId="f53f700a-6709-4045-8975-3edaa594be1c" providerId="ADAL" clId="{0FB24E5E-FE6E-4732-9C4A-D738238F2A72}" dt="2024-02-28T07:09:07.533" v="23" actId="1076"/>
+      <pc:docMkLst>
+        <pc:docMk/>
+      </pc:docMkLst>
+      <pc:sldChg chg="addSp modSp mod">
+        <pc:chgData name="pdcxs" userId="f53f700a-6709-4045-8975-3edaa594be1c" providerId="ADAL" clId="{0FB24E5E-FE6E-4732-9C4A-D738238F2A72}" dt="2024-02-28T07:09:07.533" v="23" actId="1076"/>
+        <pc:sldMkLst>
+          <pc:docMk/>
+          <pc:sldMk cId="898089864" sldId="330"/>
+        </pc:sldMkLst>
+      </pc:sldChg>
+      <pc:sldChg chg="addSp modSp mod">
+        <pc:chgData name="pdcxs" userId="f53f700a-6709-4045-8975-3edaa594be1c" providerId="ADAL" clId="{0FB24E5E-FE6E-4732-9C4A-D738238F2A72}" dt="2024-02-28T07:08:47.869" v="17" actId="1076"/>
+        <pc:sldMkLst>
+          <pc:docMk/>
+          <pc:sldMk cId="3669361931" sldId="332"/>
+        </pc:sldMkLst>
+      </pc:sldChg>
+      <pc:sldChg chg="addSp modSp mod">
+        <pc:chgData name="pdcxs" userId="f53f700a-6709-4045-8975-3edaa594be1c" providerId="ADAL" clId="{0FB24E5E-FE6E-4732-9C4A-D738238F2A72}" dt="2024-02-28T07:08:54.717" v="19" actId="1076"/>
+        <pc:sldMkLst>
+          <pc:docMk/>
+          <pc:sldMk cId="3509106168" sldId="336"/>
+        </pc:sldMkLst>
+      </pc:sldChg>
+      <pc:sldChg chg="addSp modSp mod">
+        <pc:chgData name="pdcxs" userId="f53f700a-6709-4045-8975-3edaa594be1c" providerId="ADAL" clId="{0FB24E5E-FE6E-4732-9C4A-D738238F2A72}" dt="2024-02-28T07:08:59.021" v="21" actId="1076"/>
+        <pc:sldMkLst>
+          <pc:docMk/>
+          <pc:sldMk cId="2222059338" sldId="337"/>
+        </pc:sldMkLst>
+      </pc:sldChg>
+      <pc:sldChg chg="addSp delSp modSp mod">
+        <pc:chgData name="pdcxs" userId="f53f700a-6709-4045-8975-3edaa594be1c" providerId="ADAL" clId="{0FB24E5E-FE6E-4732-9C4A-D738238F2A72}" dt="2024-02-28T07:08:39.603" v="15" actId="1076"/>
+        <pc:sldMkLst>
+          <pc:docMk/>
+          <pc:sldMk cId="1608008779" sldId="339"/>
+        </pc:sldMkLst>
+      </pc:sldChg>
+    </pc:docChg>
+  </pc:docChgLst>
+  <pc:docChgLst>
+    <pc:chgData name="pdcxs" userId="f53f700a-6709-4045-8975-3edaa594be1c" providerId="ADAL" clId="{FEB349EA-F409-46C1-804E-F00288D1825A}"/>
+    <pc:docChg chg="modSld">
+      <pc:chgData name="pdcxs" userId="f53f700a-6709-4045-8975-3edaa594be1c" providerId="ADAL" clId="{FEB349EA-F409-46C1-804E-F00288D1825A}" dt="2023-02-23T07:11:18.296" v="6" actId="20577"/>
+      <pc:docMkLst>
+        <pc:docMk/>
+      </pc:docMkLst>
+      <pc:sldChg chg="modSp mod">
+        <pc:chgData name="pdcxs" userId="f53f700a-6709-4045-8975-3edaa594be1c" providerId="ADAL" clId="{FEB349EA-F409-46C1-804E-F00288D1825A}" dt="2023-02-23T07:11:18.296" v="6" actId="20577"/>
+        <pc:sldMkLst>
+          <pc:docMk/>
+          <pc:sldMk cId="753176371" sldId="306"/>
+        </pc:sldMkLst>
+      </pc:sldChg>
+    </pc:docChg>
+  </pc:docChgLst>
+  <pc:docChgLst>
+    <pc:chgData name="pdcxs" userId="f53f700a-6709-4045-8975-3edaa594be1c" providerId="ADAL" clId="{575EB646-C274-45FE-83ED-B2D4AA3DC509}"/>
+    <pc:docChg chg="modSld">
+      <pc:chgData name="pdcxs" userId="f53f700a-6709-4045-8975-3edaa594be1c" providerId="ADAL" clId="{575EB646-C274-45FE-83ED-B2D4AA3DC509}" dt="2025-04-14T12:12:28.923" v="13"/>
+      <pc:docMkLst>
+        <pc:docMk/>
+      </pc:docMkLst>
+      <pc:sldChg chg="modSp mod">
+        <pc:chgData name="pdcxs" userId="f53f700a-6709-4045-8975-3edaa594be1c" providerId="ADAL" clId="{575EB646-C274-45FE-83ED-B2D4AA3DC509}" dt="2025-04-14T12:12:28.923" v="13"/>
+        <pc:sldMkLst>
+          <pc:docMk/>
+          <pc:sldMk cId="450456564" sldId="338"/>
+        </pc:sldMkLst>
+        <pc:spChg chg="mod">
+          <ac:chgData name="pdcxs" userId="f53f700a-6709-4045-8975-3edaa594be1c" providerId="ADAL" clId="{575EB646-C274-45FE-83ED-B2D4AA3DC509}" dt="2025-04-14T12:12:28.923" v="13"/>
+          <ac:spMkLst>
+            <pc:docMk/>
+            <pc:sldMk cId="450456564" sldId="338"/>
+            <ac:spMk id="21" creationId="{00000000-0000-0000-0000-000000000000}"/>
+          </ac:spMkLst>
+        </pc:spChg>
+      </pc:sldChg>
+    </pc:docChg>
+  </pc:docChgLst>
+  <pc:docChgLst>
+    <pc:chgData name="pdcxs" userId="f53f700a-6709-4045-8975-3edaa594be1c" providerId="ADAL" clId="{7D72E6D7-8602-457B-9799-756D4526B4C7}"/>
+    <pc:docChg chg="modSld">
+      <pc:chgData name="pdcxs" userId="f53f700a-6709-4045-8975-3edaa594be1c" providerId="ADAL" clId="{7D72E6D7-8602-457B-9799-756D4526B4C7}" dt="2024-03-04T14:32:02.691" v="44" actId="20577"/>
+      <pc:docMkLst>
+        <pc:docMk/>
+      </pc:docMkLst>
+      <pc:sldChg chg="modSp mod">
+        <pc:chgData name="pdcxs" userId="f53f700a-6709-4045-8975-3edaa594be1c" providerId="ADAL" clId="{7D72E6D7-8602-457B-9799-756D4526B4C7}" dt="2024-03-04T14:31:38.435" v="16" actId="20577"/>
+        <pc:sldMkLst>
+          <pc:docMk/>
+          <pc:sldMk cId="898089864" sldId="330"/>
+        </pc:sldMkLst>
+      </pc:sldChg>
+      <pc:sldChg chg="modSp mod">
+        <pc:chgData name="pdcxs" userId="f53f700a-6709-4045-8975-3edaa594be1c" providerId="ADAL" clId="{7D72E6D7-8602-457B-9799-756D4526B4C7}" dt="2024-03-04T14:32:02.691" v="44" actId="20577"/>
+        <pc:sldMkLst>
+          <pc:docMk/>
+          <pc:sldMk cId="3669361931" sldId="332"/>
+        </pc:sldMkLst>
+      </pc:sldChg>
+      <pc:sldChg chg="modSp mod">
+        <pc:chgData name="pdcxs" userId="f53f700a-6709-4045-8975-3edaa594be1c" providerId="ADAL" clId="{7D72E6D7-8602-457B-9799-756D4526B4C7}" dt="2024-03-04T14:31:50.675" v="32" actId="20577"/>
+        <pc:sldMkLst>
+          <pc:docMk/>
+          <pc:sldMk cId="3509106168" sldId="336"/>
+        </pc:sldMkLst>
+      </pc:sldChg>
+      <pc:sldChg chg="modSp mod">
+        <pc:chgData name="pdcxs" userId="f53f700a-6709-4045-8975-3edaa594be1c" providerId="ADAL" clId="{7D72E6D7-8602-457B-9799-756D4526B4C7}" dt="2024-03-04T14:31:58.312" v="40" actId="20577"/>
+        <pc:sldMkLst>
+          <pc:docMk/>
+          <pc:sldMk cId="2222059338" sldId="337"/>
+        </pc:sldMkLst>
+      </pc:sldChg>
+      <pc:sldChg chg="modSp mod">
+        <pc:chgData name="pdcxs" userId="f53f700a-6709-4045-8975-3edaa594be1c" providerId="ADAL" clId="{7D72E6D7-8602-457B-9799-756D4526B4C7}" dt="2024-03-04T14:31:22.633" v="4" actId="20577"/>
+        <pc:sldMkLst>
+          <pc:docMk/>
+          <pc:sldMk cId="1608008779" sldId="339"/>
         </pc:sldMkLst>
       </pc:sldChg>
     </pc:docChg>
@@ -734,7 +502,7 @@
               <a:pPr>
                 <a:defRPr/>
               </a:pPr>
-              <a:t>2024/3/4</a:t>
+              <a:t>2025/4/14</a:t>
             </a:fld>
             <a:endParaRPr lang="zh-CN" altLang="en-US"/>
           </a:p>
@@ -3414,7 +3182,7 @@
               <a:pPr>
                 <a:defRPr/>
               </a:pPr>
-              <a:t>2024/3/4</a:t>
+              <a:t>2025/4/14</a:t>
             </a:fld>
             <a:endParaRPr lang="zh-CN" altLang="en-US"/>
           </a:p>
@@ -3755,7 +3523,7 @@
               <a:pPr>
                 <a:defRPr/>
               </a:pPr>
-              <a:t>2024/3/4</a:t>
+              <a:t>2025/4/14</a:t>
             </a:fld>
             <a:endParaRPr lang="zh-CN" altLang="en-US"/>
           </a:p>
@@ -4018,7 +3786,7 @@
               <a:pPr>
                 <a:defRPr/>
               </a:pPr>
-              <a:t>2024/3/4</a:t>
+              <a:t>2025/4/14</a:t>
             </a:fld>
             <a:endParaRPr lang="zh-CN" altLang="en-US"/>
           </a:p>
@@ -4281,7 +4049,7 @@
               <a:pPr>
                 <a:defRPr/>
               </a:pPr>
-              <a:t>2024/3/4</a:t>
+              <a:t>2025/4/14</a:t>
             </a:fld>
             <a:endParaRPr lang="zh-CN" altLang="en-US"/>
           </a:p>
@@ -4589,7 +4357,7 @@
           <a:p>
             <a:fld id="{727B9DD9-119C-4B8D-B3AB-3CFC6AE69930}" type="datetimeFigureOut">
               <a:rPr lang="zh-CN" altLang="en-US" smtClean="0"/>
-              <a:t>2024/3/4</a:t>
+              <a:t>2025/4/14</a:t>
             </a:fld>
             <a:endParaRPr lang="zh-CN" altLang="en-US"/>
           </a:p>
@@ -4669,7 +4437,7 @@
         <p:random/>
       </p:transition>
     </mc:Choice>
-    <mc:Fallback xmlns="" xmlns:p15="http://schemas.microsoft.com/office/powerpoint/2012/main">
+    <mc:Fallback xmlns:p15="http://schemas.microsoft.com/office/powerpoint/2012/main" xmlns="">
       <p:transition spd="slow" advClick="0">
         <p:random/>
       </p:transition>
@@ -5951,7 +5719,7 @@
               <a:pPr>
                 <a:defRPr/>
               </a:pPr>
-              <a:t>2024/3/4</a:t>
+              <a:t>2025/4/14</a:t>
             </a:fld>
             <a:endParaRPr lang="zh-CN" altLang="en-US"/>
           </a:p>
@@ -6469,7 +6237,7 @@
               <a:pPr>
                 <a:defRPr/>
               </a:pPr>
-              <a:t>2024/3/4</a:t>
+              <a:t>2025/4/14</a:t>
             </a:fld>
             <a:endParaRPr lang="zh-CN" altLang="en-US"/>
           </a:p>
@@ -6673,7 +6441,7 @@
               <a:pPr>
                 <a:defRPr/>
               </a:pPr>
-              <a:t>2024/3/4</a:t>
+              <a:t>2025/4/14</a:t>
             </a:fld>
             <a:endParaRPr lang="zh-CN" altLang="en-US"/>
           </a:p>
@@ -6847,7 +6615,7 @@
               <a:pPr>
                 <a:defRPr/>
               </a:pPr>
-              <a:t>2024/3/4</a:t>
+              <a:t>2025/4/14</a:t>
             </a:fld>
             <a:endParaRPr lang="zh-CN" altLang="en-US"/>
           </a:p>
@@ -7533,8 +7301,8 @@
         </p:nvSpPr>
         <p:spPr>
           <a:xfrm>
-            <a:off x="4307104" y="3583212"/>
-            <a:ext cx="3793288" cy="288512"/>
+            <a:off x="5312187" y="3583212"/>
+            <a:ext cx="1783123" cy="288512"/>
           </a:xfrm>
           <a:prstGeom prst="rect">
             <a:avLst/>
@@ -7559,7 +7327,7 @@
                 <a:latin typeface="微软雅黑" pitchFamily="34" charset="-122"/>
                 <a:ea typeface="微软雅黑" pitchFamily="34" charset="-122"/>
               </a:rPr>
-              <a:t>学院：计算机科学与技术学院（大数据学院）</a:t>
+              <a:t>学院：人工智能学院</a:t>
             </a:r>
             <a:endParaRPr lang="en-US" altLang="zh-CN" sz="1425" dirty="0">
               <a:solidFill>
@@ -7707,7 +7475,7 @@
         <p:blinds dir="vert"/>
       </p:transition>
     </mc:Choice>
-    <mc:Fallback xmlns="" xmlns:p15="http://schemas.microsoft.com/office/powerpoint/2012/main">
+    <mc:Fallback xmlns:p15="http://schemas.microsoft.com/office/powerpoint/2012/main" xmlns="">
       <p:transition spd="slow" advClick="0">
         <p:blinds dir="vert"/>
       </p:transition>
@@ -13022,7 +12790,7 @@
         <p:blinds dir="vert"/>
       </p:transition>
     </mc:Choice>
-    <mc:Fallback xmlns="" xmlns:p15="http://schemas.microsoft.com/office/powerpoint/2012/main">
+    <mc:Fallback xmlns:p15="http://schemas.microsoft.com/office/powerpoint/2012/main" xmlns="">
       <p:transition spd="slow" advClick="0">
         <p:blinds dir="vert"/>
       </p:transition>
@@ -13817,7 +13585,7 @@
         <p:blinds dir="vert"/>
       </p:transition>
     </mc:Choice>
-    <mc:Fallback xmlns="" xmlns:p15="http://schemas.microsoft.com/office/powerpoint/2012/main">
+    <mc:Fallback xmlns:p15="http://schemas.microsoft.com/office/powerpoint/2012/main" xmlns="">
       <p:transition spd="slow" advClick="0">
         <p:blinds dir="vert"/>
       </p:transition>
@@ -15281,7 +15049,7 @@
         <p:blinds dir="vert"/>
       </p:transition>
     </mc:Choice>
-    <mc:Fallback xmlns="" xmlns:p15="http://schemas.microsoft.com/office/powerpoint/2012/main">
+    <mc:Fallback xmlns:p15="http://schemas.microsoft.com/office/powerpoint/2012/main" xmlns="">
       <p:transition spd="slow" advClick="0">
         <p:blinds dir="vert"/>
       </p:transition>
@@ -16082,7 +15850,7 @@
         <p:blinds dir="vert"/>
       </p:transition>
     </mc:Choice>
-    <mc:Fallback xmlns="" xmlns:p15="http://schemas.microsoft.com/office/powerpoint/2012/main">
+    <mc:Fallback xmlns:p15="http://schemas.microsoft.com/office/powerpoint/2012/main" xmlns="">
       <p:transition spd="slow" advClick="0">
         <p:blinds dir="vert"/>
       </p:transition>
@@ -16747,7 +16515,7 @@
         <p:blinds dir="vert"/>
       </p:transition>
     </mc:Choice>
-    <mc:Fallback xmlns="" xmlns:p15="http://schemas.microsoft.com/office/powerpoint/2012/main">
+    <mc:Fallback xmlns:p15="http://schemas.microsoft.com/office/powerpoint/2012/main" xmlns="">
       <p:transition spd="slow" advClick="0">
         <p:blinds dir="vert"/>
       </p:transition>
@@ -17503,7 +17271,7 @@
         <p:blinds dir="vert"/>
       </p:transition>
     </mc:Choice>
-    <mc:Fallback xmlns="" xmlns:p15="http://schemas.microsoft.com/office/powerpoint/2012/main">
+    <mc:Fallback xmlns:p15="http://schemas.microsoft.com/office/powerpoint/2012/main" xmlns="">
       <p:transition spd="slow" advClick="0">
         <p:blinds dir="vert"/>
       </p:transition>
@@ -18126,7 +17894,7 @@
         <p:blinds dir="vert"/>
       </p:transition>
     </mc:Choice>
-    <mc:Fallback xmlns="" xmlns:p15="http://schemas.microsoft.com/office/powerpoint/2012/main">
+    <mc:Fallback xmlns:p15="http://schemas.microsoft.com/office/powerpoint/2012/main" xmlns="">
       <p:transition spd="slow" advClick="0">
         <p:blinds dir="vert"/>
       </p:transition>
@@ -20986,7 +20754,7 @@
         <p14:prism/>
       </p:transition>
     </mc:Choice>
-    <mc:Fallback xmlns="" xmlns:p15="http://schemas.microsoft.com/office/powerpoint/2012/main">
+    <mc:Fallback xmlns:p15="http://schemas.microsoft.com/office/powerpoint/2012/main" xmlns="">
       <p:transition spd="slow" advClick="0">
         <p:fade/>
       </p:transition>
@@ -23899,7 +23667,7 @@
         <p:blinds dir="vert"/>
       </p:transition>
     </mc:Choice>
-    <mc:Fallback xmlns="" xmlns:p15="http://schemas.microsoft.com/office/powerpoint/2012/main">
+    <mc:Fallback xmlns:p15="http://schemas.microsoft.com/office/powerpoint/2012/main" xmlns="">
       <p:transition spd="slow" advClick="0">
         <p:blinds dir="vert"/>
       </p:transition>
@@ -24422,7 +24190,7 @@
         <p:blinds dir="vert"/>
       </p:transition>
     </mc:Choice>
-    <mc:Fallback xmlns="" xmlns:p15="http://schemas.microsoft.com/office/powerpoint/2012/main">
+    <mc:Fallback xmlns:p15="http://schemas.microsoft.com/office/powerpoint/2012/main" xmlns="">
       <p:transition spd="slow" advClick="0">
         <p:blinds dir="vert"/>
       </p:transition>
@@ -24713,7 +24481,7 @@
     <mc:Choice Requires="p14">
       <p:transition spd="slow" p14:dur="2000" advClick="0"/>
     </mc:Choice>
-    <mc:Fallback xmlns="" xmlns:p15="http://schemas.microsoft.com/office/powerpoint/2012/main">
+    <mc:Fallback xmlns:p15="http://schemas.microsoft.com/office/powerpoint/2012/main" xmlns="">
       <p:transition spd="slow" advClick="0"/>
     </mc:Fallback>
   </mc:AlternateContent>
@@ -27040,7 +26808,7 @@
         <p:blinds dir="vert"/>
       </p:transition>
     </mc:Choice>
-    <mc:Fallback xmlns="" xmlns:p15="http://schemas.microsoft.com/office/powerpoint/2012/main">
+    <mc:Fallback xmlns:p15="http://schemas.microsoft.com/office/powerpoint/2012/main" xmlns="">
       <p:transition spd="slow" advClick="0">
         <p:blinds dir="vert"/>
       </p:transition>
@@ -27756,7 +27524,7 @@
         <p:blinds dir="vert"/>
       </p:transition>
     </mc:Choice>
-    <mc:Fallback xmlns="" xmlns:p15="http://schemas.microsoft.com/office/powerpoint/2012/main">
+    <mc:Fallback xmlns:p15="http://schemas.microsoft.com/office/powerpoint/2012/main" xmlns="">
       <p:transition spd="slow" advClick="0">
         <p:blinds dir="vert"/>
       </p:transition>
@@ -28289,7 +28057,7 @@
         <p:blinds dir="vert"/>
       </p:transition>
     </mc:Choice>
-    <mc:Fallback xmlns="" xmlns:p15="http://schemas.microsoft.com/office/powerpoint/2012/main">
+    <mc:Fallback xmlns:p15="http://schemas.microsoft.com/office/powerpoint/2012/main" xmlns="">
       <p:transition spd="slow" advClick="0">
         <p:blinds dir="vert"/>
       </p:transition>
@@ -29181,7 +28949,7 @@
         <p:blinds dir="vert"/>
       </p:transition>
     </mc:Choice>
-    <mc:Fallback xmlns="" xmlns:p15="http://schemas.microsoft.com/office/powerpoint/2012/main">
+    <mc:Fallback xmlns:p15="http://schemas.microsoft.com/office/powerpoint/2012/main" xmlns="">
       <p:transition spd="slow" advClick="0">
         <p:blinds dir="vert"/>
       </p:transition>
@@ -30470,7 +30238,7 @@
         <p:blinds dir="vert"/>
       </p:transition>
     </mc:Choice>
-    <mc:Fallback xmlns="" xmlns:p15="http://schemas.microsoft.com/office/powerpoint/2012/main">
+    <mc:Fallback xmlns:p15="http://schemas.microsoft.com/office/powerpoint/2012/main" xmlns="">
       <p:transition spd="slow" advClick="0">
         <p:blinds dir="vert"/>
       </p:transition>
@@ -31180,7 +30948,7 @@
         <p:blinds dir="vert"/>
       </p:transition>
     </mc:Choice>
-    <mc:Fallback xmlns="" xmlns:p15="http://schemas.microsoft.com/office/powerpoint/2012/main">
+    <mc:Fallback xmlns:p15="http://schemas.microsoft.com/office/powerpoint/2012/main" xmlns="">
       <p:transition spd="slow" advClick="0">
         <p:blinds dir="vert"/>
       </p:transition>

</xml_diff>